<commit_message>
Implantação sistema Login e Integridade
</commit_message>
<xml_diff>
--- a/cronoawp/core/static/img/bg.pptx
+++ b/cronoawp/core/static/img/bg.pptx
@@ -6,6 +6,8 @@
   </p:sldMasterIdLst>
   <p:sldIdLst>
     <p:sldId id="256" r:id="rId2"/>
+    <p:sldId id="257" r:id="rId3"/>
+    <p:sldId id="258" r:id="rId4"/>
   </p:sldIdLst>
   <p:sldSz cx="12192000" cy="6858000"/>
   <p:notesSz cx="6858000" cy="9144000"/>
@@ -104,6 +106,11 @@
       </a:defRPr>
     </a:lvl9pPr>
   </p:defaultTextStyle>
+  <p:extLst>
+    <p:ext uri="{EFAFB233-063F-42B5-8137-9DF3F51BA10A}">
+      <p15:sldGuideLst xmlns:p15="http://schemas.microsoft.com/office/powerpoint/2012/main"/>
+    </p:ext>
+  </p:extLst>
 </p:presentation>
 </file>
 
@@ -254,7 +261,7 @@
           <a:p>
             <a:fld id="{240B626A-95AC-4916-B038-FCA3E8750DD1}" type="datetimeFigureOut">
               <a:rPr lang="pt-BR" smtClean="0"/>
-              <a:t>27/12/2021</a:t>
+              <a:t>05/03/2022</a:t>
             </a:fld>
             <a:endParaRPr lang="pt-BR"/>
           </a:p>
@@ -452,7 +459,7 @@
           <a:p>
             <a:fld id="{240B626A-95AC-4916-B038-FCA3E8750DD1}" type="datetimeFigureOut">
               <a:rPr lang="pt-BR" smtClean="0"/>
-              <a:t>27/12/2021</a:t>
+              <a:t>05/03/2022</a:t>
             </a:fld>
             <a:endParaRPr lang="pt-BR"/>
           </a:p>
@@ -660,7 +667,7 @@
           <a:p>
             <a:fld id="{240B626A-95AC-4916-B038-FCA3E8750DD1}" type="datetimeFigureOut">
               <a:rPr lang="pt-BR" smtClean="0"/>
-              <a:t>27/12/2021</a:t>
+              <a:t>05/03/2022</a:t>
             </a:fld>
             <a:endParaRPr lang="pt-BR"/>
           </a:p>
@@ -858,7 +865,7 @@
           <a:p>
             <a:fld id="{240B626A-95AC-4916-B038-FCA3E8750DD1}" type="datetimeFigureOut">
               <a:rPr lang="pt-BR" smtClean="0"/>
-              <a:t>27/12/2021</a:t>
+              <a:t>05/03/2022</a:t>
             </a:fld>
             <a:endParaRPr lang="pt-BR"/>
           </a:p>
@@ -1133,7 +1140,7 @@
           <a:p>
             <a:fld id="{240B626A-95AC-4916-B038-FCA3E8750DD1}" type="datetimeFigureOut">
               <a:rPr lang="pt-BR" smtClean="0"/>
-              <a:t>27/12/2021</a:t>
+              <a:t>05/03/2022</a:t>
             </a:fld>
             <a:endParaRPr lang="pt-BR"/>
           </a:p>
@@ -1398,7 +1405,7 @@
           <a:p>
             <a:fld id="{240B626A-95AC-4916-B038-FCA3E8750DD1}" type="datetimeFigureOut">
               <a:rPr lang="pt-BR" smtClean="0"/>
-              <a:t>27/12/2021</a:t>
+              <a:t>05/03/2022</a:t>
             </a:fld>
             <a:endParaRPr lang="pt-BR"/>
           </a:p>
@@ -1810,7 +1817,7 @@
           <a:p>
             <a:fld id="{240B626A-95AC-4916-B038-FCA3E8750DD1}" type="datetimeFigureOut">
               <a:rPr lang="pt-BR" smtClean="0"/>
-              <a:t>27/12/2021</a:t>
+              <a:t>05/03/2022</a:t>
             </a:fld>
             <a:endParaRPr lang="pt-BR"/>
           </a:p>
@@ -1951,7 +1958,7 @@
           <a:p>
             <a:fld id="{240B626A-95AC-4916-B038-FCA3E8750DD1}" type="datetimeFigureOut">
               <a:rPr lang="pt-BR" smtClean="0"/>
-              <a:t>27/12/2021</a:t>
+              <a:t>05/03/2022</a:t>
             </a:fld>
             <a:endParaRPr lang="pt-BR"/>
           </a:p>
@@ -2064,7 +2071,7 @@
           <a:p>
             <a:fld id="{240B626A-95AC-4916-B038-FCA3E8750DD1}" type="datetimeFigureOut">
               <a:rPr lang="pt-BR" smtClean="0"/>
-              <a:t>27/12/2021</a:t>
+              <a:t>05/03/2022</a:t>
             </a:fld>
             <a:endParaRPr lang="pt-BR"/>
           </a:p>
@@ -2375,7 +2382,7 @@
           <a:p>
             <a:fld id="{240B626A-95AC-4916-B038-FCA3E8750DD1}" type="datetimeFigureOut">
               <a:rPr lang="pt-BR" smtClean="0"/>
-              <a:t>27/12/2021</a:t>
+              <a:t>05/03/2022</a:t>
             </a:fld>
             <a:endParaRPr lang="pt-BR"/>
           </a:p>
@@ -2663,7 +2670,7 @@
           <a:p>
             <a:fld id="{240B626A-95AC-4916-B038-FCA3E8750DD1}" type="datetimeFigureOut">
               <a:rPr lang="pt-BR" smtClean="0"/>
-              <a:t>27/12/2021</a:t>
+              <a:t>05/03/2022</a:t>
             </a:fld>
             <a:endParaRPr lang="pt-BR"/>
           </a:p>
@@ -2904,7 +2911,7 @@
           <a:p>
             <a:fld id="{240B626A-95AC-4916-B038-FCA3E8750DD1}" type="datetimeFigureOut">
               <a:rPr lang="pt-BR" smtClean="0"/>
-              <a:t>27/12/2021</a:t>
+              <a:t>05/03/2022</a:t>
             </a:fld>
             <a:endParaRPr lang="pt-BR"/>
           </a:p>
@@ -3557,6 +3564,317 @@
 </p:sld>
 </file>
 
+<file path=ppt/slides/slide2.xml><?xml version="1.0" encoding="utf-8"?>
+<p:sld xmlns:a="http://schemas.openxmlformats.org/drawingml/2006/main" xmlns:r="http://schemas.openxmlformats.org/officeDocument/2006/relationships" xmlns:p="http://schemas.openxmlformats.org/presentationml/2006/main">
+  <p:cSld>
+    <p:spTree>
+      <p:nvGrpSpPr>
+        <p:cNvPr id="1" name=""/>
+        <p:cNvGrpSpPr/>
+        <p:nvPr/>
+      </p:nvGrpSpPr>
+      <p:grpSpPr>
+        <a:xfrm>
+          <a:off x="0" y="0"/>
+          <a:ext cx="0" cy="0"/>
+          <a:chOff x="0" y="0"/>
+          <a:chExt cx="0" cy="0"/>
+        </a:xfrm>
+      </p:grpSpPr>
+      <p:grpSp>
+        <p:nvGrpSpPr>
+          <p:cNvPr id="8" name="Agrupar 7">
+            <a:extLst>
+              <a:ext uri="{FF2B5EF4-FFF2-40B4-BE49-F238E27FC236}">
+                <a16:creationId xmlns:a16="http://schemas.microsoft.com/office/drawing/2014/main" id="{FB9846CD-DC16-47C1-A0FE-11646CC7FE18}"/>
+              </a:ext>
+            </a:extLst>
+          </p:cNvPr>
+          <p:cNvGrpSpPr/>
+          <p:nvPr/>
+        </p:nvGrpSpPr>
+        <p:grpSpPr>
+          <a:xfrm>
+            <a:off x="0" y="-1"/>
+            <a:ext cx="12192000" cy="6858001"/>
+            <a:chOff x="0" y="-1"/>
+            <a:chExt cx="12192000" cy="6858001"/>
+          </a:xfrm>
+        </p:grpSpPr>
+        <p:pic>
+          <p:nvPicPr>
+            <p:cNvPr id="1028" name="Picture 4" descr="Conceito de Planejamento: O Que é e Como Funciona? - José Roberto Marques -  Presidente do IBC Coaching">
+              <a:extLst>
+                <a:ext uri="{FF2B5EF4-FFF2-40B4-BE49-F238E27FC236}">
+                  <a16:creationId xmlns:a16="http://schemas.microsoft.com/office/drawing/2014/main" id="{C4B9B7FF-D958-46B5-9442-78F24C22ACB4}"/>
+                </a:ext>
+              </a:extLst>
+            </p:cNvPr>
+            <p:cNvPicPr>
+              <a:picLocks noChangeAspect="1" noChangeArrowheads="1"/>
+            </p:cNvPicPr>
+            <p:nvPr/>
+          </p:nvPicPr>
+          <p:blipFill>
+            <a:blip r:embed="rId2">
+              <a:extLst>
+                <a:ext uri="{28A0092B-C50C-407E-A947-70E740481C1C}">
+                  <a14:useLocalDpi xmlns:a14="http://schemas.microsoft.com/office/drawing/2010/main" val="0"/>
+                </a:ext>
+              </a:extLst>
+            </a:blip>
+            <a:srcRect/>
+            <a:stretch>
+              <a:fillRect/>
+            </a:stretch>
+          </p:blipFill>
+          <p:spPr bwMode="auto">
+            <a:xfrm>
+              <a:off x="0" y="-1"/>
+              <a:ext cx="12192000" cy="6858001"/>
+            </a:xfrm>
+            <a:prstGeom prst="rect">
+              <a:avLst/>
+            </a:prstGeom>
+            <a:noFill/>
+            <a:extLst>
+              <a:ext uri="{909E8E84-426E-40DD-AFC4-6F175D3DCCD1}">
+                <a14:hiddenFill xmlns:a14="http://schemas.microsoft.com/office/drawing/2010/main">
+                  <a:solidFill>
+                    <a:srgbClr val="FFFFFF"/>
+                  </a:solidFill>
+                </a14:hiddenFill>
+              </a:ext>
+            </a:extLst>
+          </p:spPr>
+        </p:pic>
+        <p:grpSp>
+          <p:nvGrpSpPr>
+            <p:cNvPr id="7" name="Agrupar 6">
+              <a:extLst>
+                <a:ext uri="{FF2B5EF4-FFF2-40B4-BE49-F238E27FC236}">
+                  <a16:creationId xmlns:a16="http://schemas.microsoft.com/office/drawing/2014/main" id="{F7FA30E2-4BCB-43FA-BBB3-B6D8EBFB37F7}"/>
+                </a:ext>
+              </a:extLst>
+            </p:cNvPr>
+            <p:cNvGrpSpPr/>
+            <p:nvPr/>
+          </p:nvGrpSpPr>
+          <p:grpSpPr>
+            <a:xfrm>
+              <a:off x="0" y="0"/>
+              <a:ext cx="12192000" cy="6858000"/>
+              <a:chOff x="-3918" y="0"/>
+              <a:chExt cx="10267627" cy="6383924"/>
+            </a:xfrm>
+          </p:grpSpPr>
+          <p:sp>
+            <p:nvSpPr>
+              <p:cNvPr id="4" name="Retângulo 3">
+                <a:extLst>
+                  <a:ext uri="{FF2B5EF4-FFF2-40B4-BE49-F238E27FC236}">
+                    <a16:creationId xmlns:a16="http://schemas.microsoft.com/office/drawing/2014/main" id="{1BF9AD97-A371-4F0E-A2B7-AB9464C203BA}"/>
+                  </a:ext>
+                </a:extLst>
+              </p:cNvPr>
+              <p:cNvSpPr/>
+              <p:nvPr/>
+            </p:nvSpPr>
+            <p:spPr>
+              <a:xfrm>
+                <a:off x="-3918" y="0"/>
+                <a:ext cx="10267627" cy="6383924"/>
+              </a:xfrm>
+              <a:prstGeom prst="rect">
+                <a:avLst/>
+              </a:prstGeom>
+              <a:noFill/>
+              <a:ln>
+                <a:noFill/>
+              </a:ln>
+            </p:spPr>
+            <p:style>
+              <a:lnRef idx="2">
+                <a:schemeClr val="accent1">
+                  <a:shade val="50000"/>
+                </a:schemeClr>
+              </a:lnRef>
+              <a:fillRef idx="1">
+                <a:schemeClr val="accent1"/>
+              </a:fillRef>
+              <a:effectRef idx="0">
+                <a:schemeClr val="accent1"/>
+              </a:effectRef>
+              <a:fontRef idx="minor">
+                <a:schemeClr val="lt1"/>
+              </a:fontRef>
+            </p:style>
+            <p:txBody>
+              <a:bodyPr rtlCol="0" anchor="ctr"/>
+              <a:lstStyle/>
+              <a:p>
+                <a:pPr algn="ctr"/>
+                <a:endParaRPr lang="pt-BR" dirty="0"/>
+              </a:p>
+            </p:txBody>
+          </p:sp>
+          <p:pic>
+            <p:nvPicPr>
+              <p:cNvPr id="1026" name="Picture 2" descr="Verum Partners">
+                <a:extLst>
+                  <a:ext uri="{FF2B5EF4-FFF2-40B4-BE49-F238E27FC236}">
+                    <a16:creationId xmlns:a16="http://schemas.microsoft.com/office/drawing/2014/main" id="{E42443E9-35D0-4FA0-8892-5CA38803E07F}"/>
+                  </a:ext>
+                </a:extLst>
+              </p:cNvPr>
+              <p:cNvPicPr>
+                <a:picLocks noChangeAspect="1" noChangeArrowheads="1"/>
+              </p:cNvPicPr>
+              <p:nvPr/>
+            </p:nvPicPr>
+            <p:blipFill>
+              <a:blip r:embed="rId3">
+                <a:clrChange>
+                  <a:clrFrom>
+                    <a:srgbClr val="FFFFFF"/>
+                  </a:clrFrom>
+                  <a:clrTo>
+                    <a:srgbClr val="FFFFFF">
+                      <a:alpha val="0"/>
+                    </a:srgbClr>
+                  </a:clrTo>
+                </a:clrChange>
+                <a:extLst>
+                  <a:ext uri="{28A0092B-C50C-407E-A947-70E740481C1C}">
+                    <a14:useLocalDpi xmlns:a14="http://schemas.microsoft.com/office/drawing/2010/main" val="0"/>
+                  </a:ext>
+                </a:extLst>
+              </a:blip>
+              <a:srcRect/>
+              <a:stretch>
+                <a:fillRect/>
+              </a:stretch>
+            </p:blipFill>
+            <p:spPr bwMode="auto">
+              <a:xfrm>
+                <a:off x="142782" y="137436"/>
+                <a:ext cx="2939631" cy="823097"/>
+              </a:xfrm>
+              <a:prstGeom prst="rect">
+                <a:avLst/>
+              </a:prstGeom>
+              <a:noFill/>
+              <a:extLst>
+                <a:ext uri="{909E8E84-426E-40DD-AFC4-6F175D3DCCD1}">
+                  <a14:hiddenFill xmlns:a14="http://schemas.microsoft.com/office/drawing/2010/main">
+                    <a:solidFill>
+                      <a:srgbClr val="FFFFFF"/>
+                    </a:solidFill>
+                  </a14:hiddenFill>
+                </a:ext>
+              </a:extLst>
+            </p:spPr>
+          </p:pic>
+        </p:grpSp>
+      </p:grpSp>
+    </p:spTree>
+    <p:extLst>
+      <p:ext uri="{BB962C8B-B14F-4D97-AF65-F5344CB8AC3E}">
+        <p14:creationId xmlns:p14="http://schemas.microsoft.com/office/powerpoint/2010/main" val="3577361686"/>
+      </p:ext>
+    </p:extLst>
+  </p:cSld>
+  <p:clrMapOvr>
+    <a:masterClrMapping/>
+  </p:clrMapOvr>
+</p:sld>
+</file>
+
+<file path=ppt/slides/slide3.xml><?xml version="1.0" encoding="utf-8"?>
+<p:sld xmlns:a="http://schemas.openxmlformats.org/drawingml/2006/main" xmlns:r="http://schemas.openxmlformats.org/officeDocument/2006/relationships" xmlns:p="http://schemas.openxmlformats.org/presentationml/2006/main">
+  <p:cSld>
+    <p:spTree>
+      <p:nvGrpSpPr>
+        <p:cNvPr id="1" name=""/>
+        <p:cNvGrpSpPr/>
+        <p:nvPr/>
+      </p:nvGrpSpPr>
+      <p:grpSpPr>
+        <a:xfrm>
+          <a:off x="0" y="0"/>
+          <a:ext cx="0" cy="0"/>
+          <a:chOff x="0" y="0"/>
+          <a:chExt cx="0" cy="0"/>
+        </a:xfrm>
+      </p:grpSpPr>
+      <p:pic>
+        <p:nvPicPr>
+          <p:cNvPr id="4" name="Picture 2" descr="Verum Partners">
+            <a:extLst>
+              <a:ext uri="{FF2B5EF4-FFF2-40B4-BE49-F238E27FC236}">
+                <a16:creationId xmlns:a16="http://schemas.microsoft.com/office/drawing/2014/main" id="{28B6ED34-61BA-40D0-85A1-3E59CA5CB1A2}"/>
+              </a:ext>
+            </a:extLst>
+          </p:cNvPr>
+          <p:cNvPicPr>
+            <a:picLocks noChangeAspect="1" noChangeArrowheads="1"/>
+          </p:cNvPicPr>
+          <p:nvPr/>
+        </p:nvPicPr>
+        <p:blipFill rotWithShape="1">
+          <a:blip r:embed="rId2">
+            <a:clrChange>
+              <a:clrFrom>
+                <a:srgbClr val="FFFFFF"/>
+              </a:clrFrom>
+              <a:clrTo>
+                <a:srgbClr val="FFFFFF">
+                  <a:alpha val="0"/>
+                </a:srgbClr>
+              </a:clrTo>
+            </a:clrChange>
+            <a:extLst>
+              <a:ext uri="{28A0092B-C50C-407E-A947-70E740481C1C}">
+                <a14:useLocalDpi xmlns:a14="http://schemas.microsoft.com/office/drawing/2010/main" val="0"/>
+              </a:ext>
+            </a:extLst>
+          </a:blip>
+          <a:srcRect r="75301"/>
+          <a:stretch/>
+        </p:blipFill>
+        <p:spPr bwMode="auto">
+          <a:xfrm>
+            <a:off x="250395" y="208602"/>
+            <a:ext cx="862125" cy="884221"/>
+          </a:xfrm>
+          <a:prstGeom prst="rect">
+            <a:avLst/>
+          </a:prstGeom>
+          <a:noFill/>
+          <a:extLst>
+            <a:ext uri="{909E8E84-426E-40DD-AFC4-6F175D3DCCD1}">
+              <a14:hiddenFill xmlns:a14="http://schemas.microsoft.com/office/drawing/2010/main">
+                <a:solidFill>
+                  <a:srgbClr val="FFFFFF"/>
+                </a:solidFill>
+              </a14:hiddenFill>
+            </a:ext>
+          </a:extLst>
+        </p:spPr>
+      </p:pic>
+    </p:spTree>
+    <p:extLst>
+      <p:ext uri="{BB962C8B-B14F-4D97-AF65-F5344CB8AC3E}">
+        <p14:creationId xmlns:p14="http://schemas.microsoft.com/office/powerpoint/2010/main" val="3567471760"/>
+      </p:ext>
+    </p:extLst>
+  </p:cSld>
+  <p:clrMapOvr>
+    <a:masterClrMapping/>
+  </p:clrMapOvr>
+</p:sld>
+</file>
+
 <file path=ppt/theme/theme1.xml><?xml version="1.0" encoding="utf-8"?>
 <a:theme xmlns:a="http://schemas.openxmlformats.org/drawingml/2006/main" name="Tema do Office">
   <a:themeElements>

</xml_diff>